<commit_message>
adding the analysis of the PE choice for the observational model
</commit_message>
<xml_diff>
--- a/computational_model/figures/ModelRecovery.pptx
+++ b/computational_model/figures/ModelRecovery.pptx
@@ -6,6 +6,7 @@
   </p:sldMasterIdLst>
   <p:sldIdLst>
     <p:sldId id="256" r:id="rId3"/>
+    <p:sldId id="257" r:id="rId4"/>
   </p:sldIdLst>
   <p:sldSz cx="12192000" cy="6858000"/>
   <p:notesSz cx="7559675" cy="10691812"/>
@@ -53,7 +54,7 @@
       </p:grpSpPr>
       <p:sp>
         <p:nvSpPr>
-          <p:cNvPr id="22" name="PlaceHolder 1"/>
+          <p:cNvPr id="23" name="PlaceHolder 1"/>
           <p:cNvSpPr>
             <a:spLocks noGrp="1"/>
           </p:cNvSpPr>
@@ -64,7 +65,7 @@
         <p:spPr>
           <a:xfrm>
             <a:off x="1523880" y="1122480"/>
-            <a:ext cx="9143280" cy="2386800"/>
+            <a:ext cx="9142920" cy="2386440"/>
           </a:xfrm>
           <a:prstGeom prst="rect">
             <a:avLst/>
@@ -84,7 +85,7 @@
       </p:sp>
       <p:sp>
         <p:nvSpPr>
-          <p:cNvPr id="23" name="PlaceHolder 2"/>
+          <p:cNvPr id="24" name="PlaceHolder 2"/>
           <p:cNvSpPr>
             <a:spLocks noGrp="1"/>
           </p:cNvSpPr>
@@ -95,7 +96,7 @@
         <p:spPr>
           <a:xfrm>
             <a:off x="609480" y="1604520"/>
-            <a:ext cx="10972440" cy="1896840"/>
+            <a:ext cx="10972080" cy="1896840"/>
           </a:xfrm>
           <a:prstGeom prst="rect">
             <a:avLst/>
@@ -114,7 +115,7 @@
       </p:sp>
       <p:sp>
         <p:nvSpPr>
-          <p:cNvPr id="24" name="PlaceHolder 3"/>
+          <p:cNvPr id="25" name="PlaceHolder 3"/>
           <p:cNvSpPr>
             <a:spLocks noGrp="1"/>
           </p:cNvSpPr>
@@ -125,7 +126,7 @@
         <p:spPr>
           <a:xfrm>
             <a:off x="609480" y="3682080"/>
-            <a:ext cx="10972440" cy="1896840"/>
+            <a:ext cx="10972080" cy="1896840"/>
           </a:xfrm>
           <a:prstGeom prst="rect">
             <a:avLst/>
@@ -166,7 +167,7 @@
       </p:grpSpPr>
       <p:sp>
         <p:nvSpPr>
-          <p:cNvPr id="25" name="PlaceHolder 1"/>
+          <p:cNvPr id="26" name="PlaceHolder 1"/>
           <p:cNvSpPr>
             <a:spLocks noGrp="1"/>
           </p:cNvSpPr>
@@ -177,7 +178,7 @@
         <p:spPr>
           <a:xfrm>
             <a:off x="1523880" y="1122480"/>
-            <a:ext cx="9143280" cy="2386800"/>
+            <a:ext cx="9142920" cy="2386440"/>
           </a:xfrm>
           <a:prstGeom prst="rect">
             <a:avLst/>
@@ -197,7 +198,7 @@
       </p:sp>
       <p:sp>
         <p:nvSpPr>
-          <p:cNvPr id="26" name="PlaceHolder 2"/>
+          <p:cNvPr id="27" name="PlaceHolder 2"/>
           <p:cNvSpPr>
             <a:spLocks noGrp="1"/>
           </p:cNvSpPr>
@@ -227,7 +228,7 @@
       </p:sp>
       <p:sp>
         <p:nvSpPr>
-          <p:cNvPr id="27" name="PlaceHolder 3"/>
+          <p:cNvPr id="28" name="PlaceHolder 3"/>
           <p:cNvSpPr>
             <a:spLocks noGrp="1"/>
           </p:cNvSpPr>
@@ -257,7 +258,7 @@
       </p:sp>
       <p:sp>
         <p:nvSpPr>
-          <p:cNvPr id="28" name="PlaceHolder 4"/>
+          <p:cNvPr id="29" name="PlaceHolder 4"/>
           <p:cNvSpPr>
             <a:spLocks noGrp="1"/>
           </p:cNvSpPr>
@@ -287,7 +288,7 @@
       </p:sp>
       <p:sp>
         <p:nvSpPr>
-          <p:cNvPr id="29" name="PlaceHolder 5"/>
+          <p:cNvPr id="30" name="PlaceHolder 5"/>
           <p:cNvSpPr>
             <a:spLocks noGrp="1"/>
           </p:cNvSpPr>
@@ -339,7 +340,7 @@
       </p:grpSpPr>
       <p:sp>
         <p:nvSpPr>
-          <p:cNvPr id="30" name="PlaceHolder 1"/>
+          <p:cNvPr id="31" name="PlaceHolder 1"/>
           <p:cNvSpPr>
             <a:spLocks noGrp="1"/>
           </p:cNvSpPr>
@@ -350,7 +351,7 @@
         <p:spPr>
           <a:xfrm>
             <a:off x="1523880" y="1122480"/>
-            <a:ext cx="9143280" cy="2386800"/>
+            <a:ext cx="9142920" cy="2386440"/>
           </a:xfrm>
           <a:prstGeom prst="rect">
             <a:avLst/>
@@ -370,7 +371,7 @@
       </p:sp>
       <p:sp>
         <p:nvSpPr>
-          <p:cNvPr id="31" name="PlaceHolder 2"/>
+          <p:cNvPr id="32" name="PlaceHolder 2"/>
           <p:cNvSpPr>
             <a:spLocks noGrp="1"/>
           </p:cNvSpPr>
@@ -381,7 +382,7 @@
         <p:spPr>
           <a:xfrm>
             <a:off x="609480" y="1604520"/>
-            <a:ext cx="3533040" cy="1896840"/>
+            <a:ext cx="3532680" cy="1896840"/>
           </a:xfrm>
           <a:prstGeom prst="rect">
             <a:avLst/>
@@ -400,7 +401,7 @@
       </p:sp>
       <p:sp>
         <p:nvSpPr>
-          <p:cNvPr id="32" name="PlaceHolder 3"/>
+          <p:cNvPr id="33" name="PlaceHolder 3"/>
           <p:cNvSpPr>
             <a:spLocks noGrp="1"/>
           </p:cNvSpPr>
@@ -410,8 +411,8 @@
         </p:nvSpPr>
         <p:spPr>
           <a:xfrm>
-            <a:off x="4319640" y="1604520"/>
-            <a:ext cx="3533040" cy="1896840"/>
+            <a:off x="4319280" y="1604520"/>
+            <a:ext cx="3532680" cy="1896840"/>
           </a:xfrm>
           <a:prstGeom prst="rect">
             <a:avLst/>
@@ -430,7 +431,7 @@
       </p:sp>
       <p:sp>
         <p:nvSpPr>
-          <p:cNvPr id="33" name="PlaceHolder 4"/>
+          <p:cNvPr id="34" name="PlaceHolder 4"/>
           <p:cNvSpPr>
             <a:spLocks noGrp="1"/>
           </p:cNvSpPr>
@@ -440,8 +441,8 @@
         </p:nvSpPr>
         <p:spPr>
           <a:xfrm>
-            <a:off x="8029800" y="1604520"/>
-            <a:ext cx="3533040" cy="1896840"/>
+            <a:off x="8028720" y="1604520"/>
+            <a:ext cx="3532680" cy="1896840"/>
           </a:xfrm>
           <a:prstGeom prst="rect">
             <a:avLst/>
@@ -460,7 +461,7 @@
       </p:sp>
       <p:sp>
         <p:nvSpPr>
-          <p:cNvPr id="34" name="PlaceHolder 5"/>
+          <p:cNvPr id="35" name="PlaceHolder 5"/>
           <p:cNvSpPr>
             <a:spLocks noGrp="1"/>
           </p:cNvSpPr>
@@ -471,7 +472,7 @@
         <p:spPr>
           <a:xfrm>
             <a:off x="609480" y="3682080"/>
-            <a:ext cx="3533040" cy="1896840"/>
+            <a:ext cx="3532680" cy="1896840"/>
           </a:xfrm>
           <a:prstGeom prst="rect">
             <a:avLst/>
@@ -490,7 +491,7 @@
       </p:sp>
       <p:sp>
         <p:nvSpPr>
-          <p:cNvPr id="35" name="PlaceHolder 6"/>
+          <p:cNvPr id="36" name="PlaceHolder 6"/>
           <p:cNvSpPr>
             <a:spLocks noGrp="1"/>
           </p:cNvSpPr>
@@ -500,8 +501,8 @@
         </p:nvSpPr>
         <p:spPr>
           <a:xfrm>
-            <a:off x="4319640" y="3682080"/>
-            <a:ext cx="3533040" cy="1896840"/>
+            <a:off x="4319280" y="3682080"/>
+            <a:ext cx="3532680" cy="1896840"/>
           </a:xfrm>
           <a:prstGeom prst="rect">
             <a:avLst/>
@@ -520,7 +521,7 @@
       </p:sp>
       <p:sp>
         <p:nvSpPr>
-          <p:cNvPr id="36" name="PlaceHolder 7"/>
+          <p:cNvPr id="37" name="PlaceHolder 7"/>
           <p:cNvSpPr>
             <a:spLocks noGrp="1"/>
           </p:cNvSpPr>
@@ -530,8 +531,8 @@
         </p:nvSpPr>
         <p:spPr>
           <a:xfrm>
-            <a:off x="8029800" y="3682080"/>
-            <a:ext cx="3533040" cy="1896840"/>
+            <a:off x="8028720" y="3682080"/>
+            <a:ext cx="3532680" cy="1896840"/>
           </a:xfrm>
           <a:prstGeom prst="rect">
             <a:avLst/>
@@ -572,7 +573,7 @@
       </p:grpSpPr>
       <p:sp>
         <p:nvSpPr>
-          <p:cNvPr id="1" name="PlaceHolder 1"/>
+          <p:cNvPr id="2" name="PlaceHolder 1"/>
           <p:cNvSpPr>
             <a:spLocks noGrp="1"/>
           </p:cNvSpPr>
@@ -583,7 +584,7 @@
         <p:spPr>
           <a:xfrm>
             <a:off x="1523880" y="1122480"/>
-            <a:ext cx="9143280" cy="2386800"/>
+            <a:ext cx="9142920" cy="2386440"/>
           </a:xfrm>
           <a:prstGeom prst="rect">
             <a:avLst/>
@@ -603,7 +604,7 @@
       </p:sp>
       <p:sp>
         <p:nvSpPr>
-          <p:cNvPr id="2" name="PlaceHolder 2"/>
+          <p:cNvPr id="3" name="PlaceHolder 2"/>
           <p:cNvSpPr>
             <a:spLocks noGrp="1"/>
           </p:cNvSpPr>
@@ -614,7 +615,7 @@
         <p:spPr>
           <a:xfrm>
             <a:off x="609480" y="1604520"/>
-            <a:ext cx="10972440" cy="3977280"/>
+            <a:ext cx="10972080" cy="3976920"/>
           </a:xfrm>
           <a:prstGeom prst="rect">
             <a:avLst/>
@@ -656,7 +657,7 @@
       </p:grpSpPr>
       <p:sp>
         <p:nvSpPr>
-          <p:cNvPr id="3" name="PlaceHolder 1"/>
+          <p:cNvPr id="4" name="PlaceHolder 1"/>
           <p:cNvSpPr>
             <a:spLocks noGrp="1"/>
           </p:cNvSpPr>
@@ -667,7 +668,7 @@
         <p:spPr>
           <a:xfrm>
             <a:off x="1523880" y="1122480"/>
-            <a:ext cx="9143280" cy="2386800"/>
+            <a:ext cx="9142920" cy="2386440"/>
           </a:xfrm>
           <a:prstGeom prst="rect">
             <a:avLst/>
@@ -687,7 +688,7 @@
       </p:sp>
       <p:sp>
         <p:nvSpPr>
-          <p:cNvPr id="4" name="PlaceHolder 2"/>
+          <p:cNvPr id="5" name="PlaceHolder 2"/>
           <p:cNvSpPr>
             <a:spLocks noGrp="1"/>
           </p:cNvSpPr>
@@ -698,7 +699,7 @@
         <p:spPr>
           <a:xfrm>
             <a:off x="609480" y="1604520"/>
-            <a:ext cx="10972440" cy="3977280"/>
+            <a:ext cx="10972080" cy="3976920"/>
           </a:xfrm>
           <a:prstGeom prst="rect">
             <a:avLst/>
@@ -739,7 +740,7 @@
       </p:grpSpPr>
       <p:sp>
         <p:nvSpPr>
-          <p:cNvPr id="5" name="PlaceHolder 1"/>
+          <p:cNvPr id="6" name="PlaceHolder 1"/>
           <p:cNvSpPr>
             <a:spLocks noGrp="1"/>
           </p:cNvSpPr>
@@ -750,7 +751,7 @@
         <p:spPr>
           <a:xfrm>
             <a:off x="1523880" y="1122480"/>
-            <a:ext cx="9143280" cy="2386800"/>
+            <a:ext cx="9142920" cy="2386440"/>
           </a:xfrm>
           <a:prstGeom prst="rect">
             <a:avLst/>
@@ -770,7 +771,7 @@
       </p:sp>
       <p:sp>
         <p:nvSpPr>
-          <p:cNvPr id="6" name="PlaceHolder 2"/>
+          <p:cNvPr id="7" name="PlaceHolder 2"/>
           <p:cNvSpPr>
             <a:spLocks noGrp="1"/>
           </p:cNvSpPr>
@@ -781,7 +782,7 @@
         <p:spPr>
           <a:xfrm>
             <a:off x="609480" y="1604520"/>
-            <a:ext cx="5354280" cy="3977280"/>
+            <a:ext cx="5354280" cy="3976920"/>
           </a:xfrm>
           <a:prstGeom prst="rect">
             <a:avLst/>
@@ -800,7 +801,7 @@
       </p:sp>
       <p:sp>
         <p:nvSpPr>
-          <p:cNvPr id="7" name="PlaceHolder 3"/>
+          <p:cNvPr id="8" name="PlaceHolder 3"/>
           <p:cNvSpPr>
             <a:spLocks noGrp="1"/>
           </p:cNvSpPr>
@@ -811,7 +812,7 @@
         <p:spPr>
           <a:xfrm>
             <a:off x="6231960" y="1604520"/>
-            <a:ext cx="5354280" cy="3977280"/>
+            <a:ext cx="5354280" cy="3976920"/>
           </a:xfrm>
           <a:prstGeom prst="rect">
             <a:avLst/>
@@ -852,7 +853,7 @@
       </p:grpSpPr>
       <p:sp>
         <p:nvSpPr>
-          <p:cNvPr id="8" name="PlaceHolder 1"/>
+          <p:cNvPr id="9" name="PlaceHolder 1"/>
           <p:cNvSpPr>
             <a:spLocks noGrp="1"/>
           </p:cNvSpPr>
@@ -863,7 +864,7 @@
         <p:spPr>
           <a:xfrm>
             <a:off x="1523880" y="1122480"/>
-            <a:ext cx="9143280" cy="2386800"/>
+            <a:ext cx="9142920" cy="2386440"/>
           </a:xfrm>
           <a:prstGeom prst="rect">
             <a:avLst/>
@@ -905,7 +906,7 @@
       </p:grpSpPr>
       <p:sp>
         <p:nvSpPr>
-          <p:cNvPr id="9" name="PlaceHolder 1"/>
+          <p:cNvPr id="10" name="PlaceHolder 1"/>
           <p:cNvSpPr>
             <a:spLocks noGrp="1"/>
           </p:cNvSpPr>
@@ -916,7 +917,7 @@
         <p:spPr>
           <a:xfrm>
             <a:off x="1523880" y="1122480"/>
-            <a:ext cx="9143280" cy="11064960"/>
+            <a:ext cx="9142920" cy="11063520"/>
           </a:xfrm>
           <a:prstGeom prst="rect">
             <a:avLst/>
@@ -958,7 +959,7 @@
       </p:grpSpPr>
       <p:sp>
         <p:nvSpPr>
-          <p:cNvPr id="10" name="PlaceHolder 1"/>
+          <p:cNvPr id="11" name="PlaceHolder 1"/>
           <p:cNvSpPr>
             <a:spLocks noGrp="1"/>
           </p:cNvSpPr>
@@ -969,7 +970,7 @@
         <p:spPr>
           <a:xfrm>
             <a:off x="1523880" y="1122480"/>
-            <a:ext cx="9143280" cy="2386800"/>
+            <a:ext cx="9142920" cy="2386440"/>
           </a:xfrm>
           <a:prstGeom prst="rect">
             <a:avLst/>
@@ -989,7 +990,7 @@
       </p:sp>
       <p:sp>
         <p:nvSpPr>
-          <p:cNvPr id="11" name="PlaceHolder 2"/>
+          <p:cNvPr id="12" name="PlaceHolder 2"/>
           <p:cNvSpPr>
             <a:spLocks noGrp="1"/>
           </p:cNvSpPr>
@@ -1019,7 +1020,7 @@
       </p:sp>
       <p:sp>
         <p:nvSpPr>
-          <p:cNvPr id="12" name="PlaceHolder 3"/>
+          <p:cNvPr id="13" name="PlaceHolder 3"/>
           <p:cNvSpPr>
             <a:spLocks noGrp="1"/>
           </p:cNvSpPr>
@@ -1030,7 +1031,7 @@
         <p:spPr>
           <a:xfrm>
             <a:off x="6231960" y="1604520"/>
-            <a:ext cx="5354280" cy="3977280"/>
+            <a:ext cx="5354280" cy="3976920"/>
           </a:xfrm>
           <a:prstGeom prst="rect">
             <a:avLst/>
@@ -1049,7 +1050,7 @@
       </p:sp>
       <p:sp>
         <p:nvSpPr>
-          <p:cNvPr id="13" name="PlaceHolder 4"/>
+          <p:cNvPr id="14" name="PlaceHolder 4"/>
           <p:cNvSpPr>
             <a:spLocks noGrp="1"/>
           </p:cNvSpPr>
@@ -1101,7 +1102,7 @@
       </p:grpSpPr>
       <p:sp>
         <p:nvSpPr>
-          <p:cNvPr id="14" name="PlaceHolder 1"/>
+          <p:cNvPr id="15" name="PlaceHolder 1"/>
           <p:cNvSpPr>
             <a:spLocks noGrp="1"/>
           </p:cNvSpPr>
@@ -1112,7 +1113,7 @@
         <p:spPr>
           <a:xfrm>
             <a:off x="1523880" y="1122480"/>
-            <a:ext cx="9143280" cy="2386800"/>
+            <a:ext cx="9142920" cy="2386440"/>
           </a:xfrm>
           <a:prstGeom prst="rect">
             <a:avLst/>
@@ -1132,7 +1133,7 @@
       </p:sp>
       <p:sp>
         <p:nvSpPr>
-          <p:cNvPr id="15" name="PlaceHolder 2"/>
+          <p:cNvPr id="16" name="PlaceHolder 2"/>
           <p:cNvSpPr>
             <a:spLocks noGrp="1"/>
           </p:cNvSpPr>
@@ -1143,7 +1144,7 @@
         <p:spPr>
           <a:xfrm>
             <a:off x="609480" y="1604520"/>
-            <a:ext cx="5354280" cy="3977280"/>
+            <a:ext cx="5354280" cy="3976920"/>
           </a:xfrm>
           <a:prstGeom prst="rect">
             <a:avLst/>
@@ -1162,7 +1163,7 @@
       </p:sp>
       <p:sp>
         <p:nvSpPr>
-          <p:cNvPr id="16" name="PlaceHolder 3"/>
+          <p:cNvPr id="17" name="PlaceHolder 3"/>
           <p:cNvSpPr>
             <a:spLocks noGrp="1"/>
           </p:cNvSpPr>
@@ -1192,7 +1193,7 @@
       </p:sp>
       <p:sp>
         <p:nvSpPr>
-          <p:cNvPr id="17" name="PlaceHolder 4"/>
+          <p:cNvPr id="18" name="PlaceHolder 4"/>
           <p:cNvSpPr>
             <a:spLocks noGrp="1"/>
           </p:cNvSpPr>
@@ -1244,7 +1245,7 @@
       </p:grpSpPr>
       <p:sp>
         <p:nvSpPr>
-          <p:cNvPr id="18" name="PlaceHolder 1"/>
+          <p:cNvPr id="19" name="PlaceHolder 1"/>
           <p:cNvSpPr>
             <a:spLocks noGrp="1"/>
           </p:cNvSpPr>
@@ -1255,7 +1256,7 @@
         <p:spPr>
           <a:xfrm>
             <a:off x="1523880" y="1122480"/>
-            <a:ext cx="9143280" cy="2386800"/>
+            <a:ext cx="9142920" cy="2386440"/>
           </a:xfrm>
           <a:prstGeom prst="rect">
             <a:avLst/>
@@ -1275,7 +1276,7 @@
       </p:sp>
       <p:sp>
         <p:nvSpPr>
-          <p:cNvPr id="19" name="PlaceHolder 2"/>
+          <p:cNvPr id="20" name="PlaceHolder 2"/>
           <p:cNvSpPr>
             <a:spLocks noGrp="1"/>
           </p:cNvSpPr>
@@ -1305,7 +1306,7 @@
       </p:sp>
       <p:sp>
         <p:nvSpPr>
-          <p:cNvPr id="20" name="PlaceHolder 3"/>
+          <p:cNvPr id="21" name="PlaceHolder 3"/>
           <p:cNvSpPr>
             <a:spLocks noGrp="1"/>
           </p:cNvSpPr>
@@ -1335,7 +1336,7 @@
       </p:sp>
       <p:sp>
         <p:nvSpPr>
-          <p:cNvPr id="21" name="PlaceHolder 4"/>
+          <p:cNvPr id="22" name="PlaceHolder 4"/>
           <p:cNvSpPr>
             <a:spLocks noGrp="1"/>
           </p:cNvSpPr>
@@ -1346,7 +1347,7 @@
         <p:spPr>
           <a:xfrm>
             <a:off x="609480" y="3682080"/>
-            <a:ext cx="10972440" cy="1896840"/>
+            <a:ext cx="10972080" cy="1896840"/>
           </a:xfrm>
           <a:prstGeom prst="rect">
             <a:avLst/>
@@ -1405,7 +1406,7 @@
         <p:spPr>
           <a:xfrm>
             <a:off x="1523880" y="1122480"/>
-            <a:ext cx="9143280" cy="2386800"/>
+            <a:ext cx="9142920" cy="2386440"/>
           </a:xfrm>
           <a:prstGeom prst="rect">
             <a:avLst/>
@@ -1421,6 +1422,185 @@
                 <a:latin typeface="Arial"/>
               </a:rPr>
               <a:t>Click to edit the title text format</a:t>
+            </a:r>
+            <a:endParaRPr b="0" lang="en-US" sz="1800" spc="-1" strike="noStrike">
+              <a:latin typeface="Arial"/>
+            </a:endParaRPr>
+          </a:p>
+        </p:txBody>
+      </p:sp>
+      <p:sp>
+        <p:nvSpPr>
+          <p:cNvPr id="1" name="PlaceHolder 2"/>
+          <p:cNvSpPr>
+            <a:spLocks noGrp="1"/>
+          </p:cNvSpPr>
+          <p:nvPr>
+            <p:ph type="body"/>
+          </p:nvPr>
+        </p:nvSpPr>
+        <p:spPr>
+          <a:xfrm>
+            <a:off x="609480" y="1604520"/>
+            <a:ext cx="10972080" cy="3976920"/>
+          </a:xfrm>
+          <a:prstGeom prst="rect">
+            <a:avLst/>
+          </a:prstGeom>
+        </p:spPr>
+        <p:txBody>
+          <a:bodyPr lIns="0" rIns="0" tIns="0" bIns="0">
+            <a:normAutofit/>
+          </a:bodyPr>
+          <a:p>
+            <a:pPr marL="432000" indent="-324000">
+              <a:spcBef>
+                <a:spcPts val="1417"/>
+              </a:spcBef>
+              <a:buClr>
+                <a:srgbClr val="000000"/>
+              </a:buClr>
+              <a:buSzPct val="45000"/>
+              <a:buFont typeface="Wingdings" charset="2"/>
+              <a:buChar char=""/>
+            </a:pPr>
+            <a:r>
+              <a:rPr b="0" lang="en-US" sz="1800" spc="-1" strike="noStrike">
+                <a:latin typeface="Arial"/>
+              </a:rPr>
+              <a:t>Click to edit the outline text format</a:t>
+            </a:r>
+            <a:endParaRPr b="0" lang="en-US" sz="1800" spc="-1" strike="noStrike">
+              <a:latin typeface="Arial"/>
+            </a:endParaRPr>
+          </a:p>
+          <a:p>
+            <a:pPr lvl="1" marL="864000" indent="-324000">
+              <a:spcBef>
+                <a:spcPts val="1134"/>
+              </a:spcBef>
+              <a:buClr>
+                <a:srgbClr val="000000"/>
+              </a:buClr>
+              <a:buSzPct val="75000"/>
+              <a:buFont typeface="Symbol" charset="2"/>
+              <a:buChar char=""/>
+            </a:pPr>
+            <a:r>
+              <a:rPr b="0" lang="en-US" sz="1800" spc="-1" strike="noStrike">
+                <a:latin typeface="Arial"/>
+              </a:rPr>
+              <a:t>Second Outline Level</a:t>
+            </a:r>
+            <a:endParaRPr b="0" lang="en-US" sz="1800" spc="-1" strike="noStrike">
+              <a:latin typeface="Arial"/>
+            </a:endParaRPr>
+          </a:p>
+          <a:p>
+            <a:pPr lvl="2" marL="1296000" indent="-288000">
+              <a:spcBef>
+                <a:spcPts val="850"/>
+              </a:spcBef>
+              <a:buClr>
+                <a:srgbClr val="000000"/>
+              </a:buClr>
+              <a:buSzPct val="45000"/>
+              <a:buFont typeface="Wingdings" charset="2"/>
+              <a:buChar char=""/>
+            </a:pPr>
+            <a:r>
+              <a:rPr b="0" lang="en-US" sz="1800" spc="-1" strike="noStrike">
+                <a:latin typeface="Arial"/>
+              </a:rPr>
+              <a:t>Third Outline Level</a:t>
+            </a:r>
+            <a:endParaRPr b="0" lang="en-US" sz="1800" spc="-1" strike="noStrike">
+              <a:latin typeface="Arial"/>
+            </a:endParaRPr>
+          </a:p>
+          <a:p>
+            <a:pPr lvl="3" marL="1728000" indent="-216000">
+              <a:spcBef>
+                <a:spcPts val="567"/>
+              </a:spcBef>
+              <a:buClr>
+                <a:srgbClr val="000000"/>
+              </a:buClr>
+              <a:buSzPct val="75000"/>
+              <a:buFont typeface="Symbol" charset="2"/>
+              <a:buChar char=""/>
+            </a:pPr>
+            <a:r>
+              <a:rPr b="0" lang="en-US" sz="1800" spc="-1" strike="noStrike">
+                <a:latin typeface="Arial"/>
+              </a:rPr>
+              <a:t>Fourth Outline Level</a:t>
+            </a:r>
+            <a:endParaRPr b="0" lang="en-US" sz="1800" spc="-1" strike="noStrike">
+              <a:latin typeface="Arial"/>
+            </a:endParaRPr>
+          </a:p>
+          <a:p>
+            <a:pPr lvl="4" marL="2160000" indent="-216000">
+              <a:spcBef>
+                <a:spcPts val="283"/>
+              </a:spcBef>
+              <a:buClr>
+                <a:srgbClr val="000000"/>
+              </a:buClr>
+              <a:buSzPct val="45000"/>
+              <a:buFont typeface="Wingdings" charset="2"/>
+              <a:buChar char=""/>
+            </a:pPr>
+            <a:r>
+              <a:rPr b="0" lang="en-US" sz="1800" spc="-1" strike="noStrike">
+                <a:latin typeface="Arial"/>
+              </a:rPr>
+              <a:t>Fifth Outline Level</a:t>
+            </a:r>
+            <a:endParaRPr b="0" lang="en-US" sz="1800" spc="-1" strike="noStrike">
+              <a:latin typeface="Arial"/>
+            </a:endParaRPr>
+          </a:p>
+          <a:p>
+            <a:pPr lvl="5" marL="2592000" indent="-216000">
+              <a:spcBef>
+                <a:spcPts val="283"/>
+              </a:spcBef>
+              <a:buClr>
+                <a:srgbClr val="000000"/>
+              </a:buClr>
+              <a:buSzPct val="45000"/>
+              <a:buFont typeface="Wingdings" charset="2"/>
+              <a:buChar char=""/>
+            </a:pPr>
+            <a:r>
+              <a:rPr b="0" lang="en-US" sz="1800" spc="-1" strike="noStrike">
+                <a:latin typeface="Arial"/>
+              </a:rPr>
+              <a:t>Sixth Outline Level</a:t>
+            </a:r>
+            <a:endParaRPr b="0" lang="en-US" sz="1800" spc="-1" strike="noStrike">
+              <a:latin typeface="Arial"/>
+            </a:endParaRPr>
+          </a:p>
+          <a:p>
+            <a:pPr lvl="6" marL="3024000" indent="-216000">
+              <a:spcBef>
+                <a:spcPts val="283"/>
+              </a:spcBef>
+              <a:buClr>
+                <a:srgbClr val="000000"/>
+              </a:buClr>
+              <a:buSzPct val="45000"/>
+              <a:buFont typeface="Wingdings" charset="2"/>
+              <a:buChar char=""/>
+            </a:pPr>
+            <a:r>
+              <a:rPr b="0" lang="en-US" sz="1800" spc="-1" strike="noStrike">
+                <a:latin typeface="Arial"/>
+              </a:rPr>
+              <a:t>Seventh Outline Level</a:t>
             </a:r>
             <a:endParaRPr b="0" lang="en-US" sz="1800" spc="-1" strike="noStrike">
               <a:latin typeface="Arial"/>
@@ -1467,14 +1647,14 @@
       </p:grpSpPr>
       <p:sp>
         <p:nvSpPr>
-          <p:cNvPr id="37" name="CustomShape 1"/>
+          <p:cNvPr id="38" name="CustomShape 1"/>
           <p:cNvSpPr/>
           <p:nvPr/>
         </p:nvSpPr>
         <p:spPr>
           <a:xfrm>
             <a:off x="1430640" y="1518840"/>
-            <a:ext cx="882720" cy="364320"/>
+            <a:ext cx="882360" cy="363960"/>
           </a:xfrm>
           <a:prstGeom prst="rect">
             <a:avLst/>
@@ -1518,14 +1698,14 @@
       </p:sp>
       <p:sp>
         <p:nvSpPr>
-          <p:cNvPr id="38" name="CustomShape 2"/>
+          <p:cNvPr id="39" name="CustomShape 2"/>
           <p:cNvSpPr/>
           <p:nvPr/>
         </p:nvSpPr>
         <p:spPr>
           <a:xfrm>
             <a:off x="6214680" y="1518840"/>
-            <a:ext cx="882720" cy="364320"/>
+            <a:ext cx="882360" cy="363960"/>
           </a:xfrm>
           <a:prstGeom prst="rect">
             <a:avLst/>
@@ -1569,14 +1749,14 @@
       </p:sp>
       <p:sp>
         <p:nvSpPr>
-          <p:cNvPr id="39" name="CustomShape 3"/>
+          <p:cNvPr id="40" name="CustomShape 3"/>
           <p:cNvSpPr/>
           <p:nvPr/>
         </p:nvSpPr>
         <p:spPr>
           <a:xfrm>
             <a:off x="2910600" y="1518840"/>
-            <a:ext cx="882720" cy="364320"/>
+            <a:ext cx="882360" cy="363960"/>
           </a:xfrm>
           <a:prstGeom prst="rect">
             <a:avLst/>
@@ -1620,14 +1800,14 @@
       </p:sp>
       <p:sp>
         <p:nvSpPr>
-          <p:cNvPr id="40" name="CustomShape 4"/>
+          <p:cNvPr id="41" name="CustomShape 4"/>
           <p:cNvSpPr/>
           <p:nvPr/>
         </p:nvSpPr>
         <p:spPr>
           <a:xfrm>
             <a:off x="181440" y="2588760"/>
-            <a:ext cx="882720" cy="364320"/>
+            <a:ext cx="882360" cy="363960"/>
           </a:xfrm>
           <a:prstGeom prst="rect">
             <a:avLst/>
@@ -1671,14 +1851,14 @@
       </p:sp>
       <p:sp>
         <p:nvSpPr>
-          <p:cNvPr id="41" name="CustomShape 5"/>
+          <p:cNvPr id="42" name="CustomShape 5"/>
           <p:cNvSpPr/>
           <p:nvPr/>
         </p:nvSpPr>
         <p:spPr>
           <a:xfrm>
             <a:off x="7632000" y="1518840"/>
-            <a:ext cx="882720" cy="364320"/>
+            <a:ext cx="882360" cy="363960"/>
           </a:xfrm>
           <a:prstGeom prst="rect">
             <a:avLst/>
@@ -1722,14 +1902,14 @@
       </p:sp>
       <p:sp>
         <p:nvSpPr>
-          <p:cNvPr id="42" name="CustomShape 6"/>
+          <p:cNvPr id="43" name="CustomShape 6"/>
           <p:cNvSpPr/>
           <p:nvPr/>
         </p:nvSpPr>
         <p:spPr>
           <a:xfrm>
             <a:off x="8933040" y="1518840"/>
-            <a:ext cx="882720" cy="364320"/>
+            <a:ext cx="882360" cy="363960"/>
           </a:xfrm>
           <a:prstGeom prst="rect">
             <a:avLst/>
@@ -1773,14 +1953,14 @@
       </p:sp>
       <p:sp>
         <p:nvSpPr>
-          <p:cNvPr id="43" name="CustomShape 7"/>
+          <p:cNvPr id="44" name="CustomShape 7"/>
           <p:cNvSpPr/>
           <p:nvPr/>
         </p:nvSpPr>
         <p:spPr>
           <a:xfrm>
             <a:off x="4319640" y="1518840"/>
-            <a:ext cx="882720" cy="364320"/>
+            <a:ext cx="882360" cy="363960"/>
           </a:xfrm>
           <a:prstGeom prst="rect">
             <a:avLst/>
@@ -1824,14 +2004,14 @@
       </p:sp>
       <p:sp>
         <p:nvSpPr>
-          <p:cNvPr id="44" name="CustomShape 8"/>
+          <p:cNvPr id="45" name="CustomShape 8"/>
           <p:cNvSpPr/>
           <p:nvPr/>
         </p:nvSpPr>
         <p:spPr>
           <a:xfrm>
             <a:off x="217440" y="3808440"/>
-            <a:ext cx="882720" cy="364320"/>
+            <a:ext cx="882360" cy="363960"/>
           </a:xfrm>
           <a:prstGeom prst="rect">
             <a:avLst/>
@@ -1875,14 +2055,14 @@
       </p:sp>
       <p:sp>
         <p:nvSpPr>
-          <p:cNvPr id="45" name="CustomShape 9"/>
+          <p:cNvPr id="46" name="CustomShape 9"/>
           <p:cNvSpPr/>
           <p:nvPr/>
         </p:nvSpPr>
         <p:spPr>
           <a:xfrm>
             <a:off x="217440" y="5064480"/>
-            <a:ext cx="882720" cy="364320"/>
+            <a:ext cx="882360" cy="363960"/>
           </a:xfrm>
           <a:prstGeom prst="rect">
             <a:avLst/>
@@ -1926,14 +2106,14 @@
       </p:sp>
       <p:sp>
         <p:nvSpPr>
-          <p:cNvPr id="46" name="CustomShape 10"/>
+          <p:cNvPr id="47" name="CustomShape 10"/>
           <p:cNvSpPr/>
           <p:nvPr/>
         </p:nvSpPr>
         <p:spPr>
           <a:xfrm>
             <a:off x="5616000" y="1208880"/>
-            <a:ext cx="882720" cy="455760"/>
+            <a:ext cx="882360" cy="455400"/>
           </a:xfrm>
           <a:prstGeom prst="rect">
             <a:avLst/>
@@ -1977,14 +2157,14 @@
       </p:sp>
       <p:sp>
         <p:nvSpPr>
-          <p:cNvPr id="47" name="CustomShape 11"/>
+          <p:cNvPr id="48" name="CustomShape 11"/>
           <p:cNvSpPr/>
           <p:nvPr/>
         </p:nvSpPr>
         <p:spPr>
           <a:xfrm>
             <a:off x="869040" y="1209600"/>
-            <a:ext cx="882720" cy="455760"/>
+            <a:ext cx="882360" cy="455400"/>
           </a:xfrm>
           <a:prstGeom prst="rect">
             <a:avLst/>
@@ -2028,7 +2208,7 @@
       </p:sp>
       <p:pic>
         <p:nvPicPr>
-          <p:cNvPr id="48" name="" descr=""/>
+          <p:cNvPr id="49" name="" descr=""/>
           <p:cNvPicPr/>
           <p:nvPr/>
         </p:nvPicPr>
@@ -2040,7 +2220,7 @@
         <p:spPr>
           <a:xfrm>
             <a:off x="897840" y="2011680"/>
-            <a:ext cx="4588200" cy="4129920"/>
+            <a:ext cx="4587840" cy="4129560"/>
           </a:xfrm>
           <a:prstGeom prst="rect">
             <a:avLst/>
@@ -2052,7 +2232,7 @@
       </p:pic>
       <p:pic>
         <p:nvPicPr>
-          <p:cNvPr id="49" name="" descr=""/>
+          <p:cNvPr id="50" name="" descr=""/>
           <p:cNvPicPr/>
           <p:nvPr/>
         </p:nvPicPr>
@@ -2064,7 +2244,7 @@
         <p:spPr>
           <a:xfrm>
             <a:off x="5642640" y="2011680"/>
-            <a:ext cx="6274080" cy="4119120"/>
+            <a:ext cx="6273720" cy="4118760"/>
           </a:xfrm>
           <a:prstGeom prst="rect">
             <a:avLst/>
@@ -2074,6 +2254,798 @@
           </a:ln>
         </p:spPr>
       </p:pic>
+    </p:spTree>
+  </p:cSld>
+  <mc:AlternateContent>
+    <mc:Choice Requires="p14">
+      <p:transition spd="slow" p14:dur="2000"/>
+    </mc:Choice>
+    <mc:Fallback>
+      <p:transition spd="slow"/>
+    </mc:Fallback>
+  </mc:AlternateContent>
+</p:sld>
+</file>
+
+<file path=ppt/slides/slide2.xml><?xml version="1.0" encoding="utf-8"?>
+<p:sld xmlns:a="http://schemas.openxmlformats.org/drawingml/2006/main" xmlns:p="http://schemas.openxmlformats.org/presentationml/2006/main" xmlns:r="http://schemas.openxmlformats.org/officeDocument/2006/relationships" xmlns:p14="http://schemas.microsoft.com/office/powerpoint/2010/main" xmlns:p15="http://schemas.microsoft.com/office/powerpoint/2012/main" xmlns:mc="http://schemas.openxmlformats.org/markup-compatibility/2006">
+  <p:cSld>
+    <p:spTree>
+      <p:nvGrpSpPr>
+        <p:cNvPr id="1" name=""/>
+        <p:cNvGrpSpPr/>
+        <p:nvPr/>
+      </p:nvGrpSpPr>
+      <p:grpSpPr>
+        <a:xfrm>
+          <a:off x="0" y="0"/>
+          <a:ext cx="0" cy="0"/>
+          <a:chOff x="0" y="0"/>
+          <a:chExt cx="0" cy="0"/>
+        </a:xfrm>
+      </p:grpSpPr>
+      <p:pic>
+        <p:nvPicPr>
+          <p:cNvPr id="51" name="" descr=""/>
+          <p:cNvPicPr/>
+          <p:nvPr/>
+        </p:nvPicPr>
+        <p:blipFill>
+          <a:blip r:embed="rId1"/>
+          <a:srcRect l="21683" t="17244" r="23356" b="0"/>
+          <a:stretch/>
+        </p:blipFill>
+        <p:spPr>
+          <a:xfrm>
+            <a:off x="5924160" y="2011680"/>
+            <a:ext cx="4572000" cy="4301280"/>
+          </a:xfrm>
+          <a:prstGeom prst="rect">
+            <a:avLst/>
+          </a:prstGeom>
+          <a:ln>
+            <a:noFill/>
+          </a:ln>
+        </p:spPr>
+      </p:pic>
+      <p:sp>
+        <p:nvSpPr>
+          <p:cNvPr id="52" name="CustomShape 1"/>
+          <p:cNvSpPr/>
+          <p:nvPr/>
+        </p:nvSpPr>
+        <p:spPr>
+          <a:xfrm>
+            <a:off x="1322640" y="1590840"/>
+            <a:ext cx="882360" cy="363960"/>
+          </a:xfrm>
+          <a:prstGeom prst="rect">
+            <a:avLst/>
+          </a:prstGeom>
+          <a:noFill/>
+          <a:ln>
+            <a:noFill/>
+          </a:ln>
+        </p:spPr>
+        <p:style>
+          <a:lnRef idx="0"/>
+          <a:fillRef idx="0"/>
+          <a:effectRef idx="0"/>
+          <a:fontRef idx="minor"/>
+        </p:style>
+        <p:txBody>
+          <a:bodyPr lIns="90000" rIns="90000" tIns="45000" bIns="45000">
+            <a:spAutoFit/>
+          </a:bodyPr>
+          <a:p>
+            <a:pPr>
+              <a:lnSpc>
+                <a:spcPct val="100000"/>
+              </a:lnSpc>
+            </a:pPr>
+            <a:r>
+              <a:rPr b="0" lang="en-US" sz="1800" spc="-1" strike="noStrike">
+                <a:solidFill>
+                  <a:srgbClr val="000000"/>
+                </a:solidFill>
+                <a:latin typeface="Calibri"/>
+                <a:ea typeface="DejaVu Sans"/>
+              </a:rPr>
+              <a:t>dLRI</a:t>
+            </a:r>
+            <a:endParaRPr b="0" lang="en-US" sz="1800" spc="-1" strike="noStrike">
+              <a:latin typeface="Arial"/>
+            </a:endParaRPr>
+          </a:p>
+        </p:txBody>
+      </p:sp>
+      <p:sp>
+        <p:nvSpPr>
+          <p:cNvPr id="53" name="CustomShape 2"/>
+          <p:cNvSpPr/>
+          <p:nvPr/>
+        </p:nvSpPr>
+        <p:spPr>
+          <a:xfrm>
+            <a:off x="3522600" y="1590840"/>
+            <a:ext cx="882360" cy="363960"/>
+          </a:xfrm>
+          <a:prstGeom prst="rect">
+            <a:avLst/>
+          </a:prstGeom>
+          <a:noFill/>
+          <a:ln>
+            <a:noFill/>
+          </a:ln>
+        </p:spPr>
+        <p:style>
+          <a:lnRef idx="0"/>
+          <a:fillRef idx="0"/>
+          <a:effectRef idx="0"/>
+          <a:fontRef idx="minor"/>
+        </p:style>
+        <p:txBody>
+          <a:bodyPr lIns="90000" rIns="90000" tIns="45000" bIns="45000">
+            <a:spAutoFit/>
+          </a:bodyPr>
+          <a:p>
+            <a:pPr>
+              <a:lnSpc>
+                <a:spcPct val="100000"/>
+              </a:lnSpc>
+            </a:pPr>
+            <a:r>
+              <a:rPr b="0" lang="en-US" sz="1800" spc="-1" strike="noStrike">
+                <a:solidFill>
+                  <a:srgbClr val="000000"/>
+                </a:solidFill>
+                <a:latin typeface="Calibri"/>
+                <a:ea typeface="DejaVu Sans"/>
+              </a:rPr>
+              <a:t>fLRI</a:t>
+            </a:r>
+            <a:endParaRPr b="0" lang="en-US" sz="1800" spc="-1" strike="noStrike">
+              <a:latin typeface="Arial"/>
+            </a:endParaRPr>
+          </a:p>
+        </p:txBody>
+      </p:sp>
+      <p:sp>
+        <p:nvSpPr>
+          <p:cNvPr id="54" name="CustomShape 3"/>
+          <p:cNvSpPr/>
+          <p:nvPr/>
+        </p:nvSpPr>
+        <p:spPr>
+          <a:xfrm>
+            <a:off x="325440" y="2444760"/>
+            <a:ext cx="882360" cy="363960"/>
+          </a:xfrm>
+          <a:prstGeom prst="rect">
+            <a:avLst/>
+          </a:prstGeom>
+          <a:noFill/>
+          <a:ln>
+            <a:noFill/>
+          </a:ln>
+        </p:spPr>
+        <p:style>
+          <a:lnRef idx="0"/>
+          <a:fillRef idx="0"/>
+          <a:effectRef idx="0"/>
+          <a:fontRef idx="minor"/>
+        </p:style>
+        <p:txBody>
+          <a:bodyPr lIns="90000" rIns="90000" tIns="45000" bIns="45000">
+            <a:spAutoFit/>
+          </a:bodyPr>
+          <a:p>
+            <a:pPr>
+              <a:lnSpc>
+                <a:spcPct val="100000"/>
+              </a:lnSpc>
+            </a:pPr>
+            <a:r>
+              <a:rPr b="0" lang="en-US" sz="1800" spc="-1" strike="noStrike">
+                <a:solidFill>
+                  <a:srgbClr val="000000"/>
+                </a:solidFill>
+                <a:latin typeface="Calibri"/>
+                <a:ea typeface="DejaVu Sans"/>
+              </a:rPr>
+              <a:t>dLRI</a:t>
+            </a:r>
+            <a:endParaRPr b="0" lang="en-US" sz="1800" spc="-1" strike="noStrike">
+              <a:latin typeface="Arial"/>
+            </a:endParaRPr>
+          </a:p>
+        </p:txBody>
+      </p:sp>
+      <p:sp>
+        <p:nvSpPr>
+          <p:cNvPr id="55" name="CustomShape 4"/>
+          <p:cNvSpPr/>
+          <p:nvPr/>
+        </p:nvSpPr>
+        <p:spPr>
+          <a:xfrm>
+            <a:off x="4571640" y="1590840"/>
+            <a:ext cx="882360" cy="363960"/>
+          </a:xfrm>
+          <a:prstGeom prst="rect">
+            <a:avLst/>
+          </a:prstGeom>
+          <a:noFill/>
+          <a:ln>
+            <a:noFill/>
+          </a:ln>
+        </p:spPr>
+        <p:style>
+          <a:lnRef idx="0"/>
+          <a:fillRef idx="0"/>
+          <a:effectRef idx="0"/>
+          <a:fontRef idx="minor"/>
+        </p:style>
+        <p:txBody>
+          <a:bodyPr lIns="90000" rIns="90000" tIns="45000" bIns="45000">
+            <a:spAutoFit/>
+          </a:bodyPr>
+          <a:p>
+            <a:pPr>
+              <a:lnSpc>
+                <a:spcPct val="100000"/>
+              </a:lnSpc>
+            </a:pPr>
+            <a:r>
+              <a:rPr b="0" lang="en-US" sz="1800" spc="-1" strike="noStrike">
+                <a:solidFill>
+                  <a:srgbClr val="000000"/>
+                </a:solidFill>
+                <a:latin typeface="Calibri"/>
+                <a:ea typeface="DejaVu Sans"/>
+              </a:rPr>
+              <a:t>fLRE</a:t>
+            </a:r>
+            <a:endParaRPr b="0" lang="en-US" sz="1800" spc="-1" strike="noStrike">
+              <a:latin typeface="Arial"/>
+            </a:endParaRPr>
+          </a:p>
+        </p:txBody>
+      </p:sp>
+      <p:sp>
+        <p:nvSpPr>
+          <p:cNvPr id="56" name="CustomShape 5"/>
+          <p:cNvSpPr/>
+          <p:nvPr/>
+        </p:nvSpPr>
+        <p:spPr>
+          <a:xfrm>
+            <a:off x="361440" y="4384440"/>
+            <a:ext cx="882360" cy="363960"/>
+          </a:xfrm>
+          <a:prstGeom prst="rect">
+            <a:avLst/>
+          </a:prstGeom>
+          <a:noFill/>
+          <a:ln>
+            <a:noFill/>
+          </a:ln>
+        </p:spPr>
+        <p:style>
+          <a:lnRef idx="0"/>
+          <a:fillRef idx="0"/>
+          <a:effectRef idx="0"/>
+          <a:fontRef idx="minor"/>
+        </p:style>
+        <p:txBody>
+          <a:bodyPr lIns="90000" rIns="90000" tIns="45000" bIns="45000">
+            <a:spAutoFit/>
+          </a:bodyPr>
+          <a:p>
+            <a:pPr>
+              <a:lnSpc>
+                <a:spcPct val="100000"/>
+              </a:lnSpc>
+            </a:pPr>
+            <a:r>
+              <a:rPr b="0" lang="en-US" sz="1800" spc="-1" strike="noStrike">
+                <a:solidFill>
+                  <a:srgbClr val="000000"/>
+                </a:solidFill>
+                <a:latin typeface="Calibri"/>
+                <a:ea typeface="DejaVu Sans"/>
+              </a:rPr>
+              <a:t>fLRI</a:t>
+            </a:r>
+            <a:endParaRPr b="0" lang="en-US" sz="1800" spc="-1" strike="noStrike">
+              <a:latin typeface="Arial"/>
+            </a:endParaRPr>
+          </a:p>
+        </p:txBody>
+      </p:sp>
+      <p:sp>
+        <p:nvSpPr>
+          <p:cNvPr id="57" name="CustomShape 6"/>
+          <p:cNvSpPr/>
+          <p:nvPr/>
+        </p:nvSpPr>
+        <p:spPr>
+          <a:xfrm>
+            <a:off x="289440" y="5352480"/>
+            <a:ext cx="882360" cy="363960"/>
+          </a:xfrm>
+          <a:prstGeom prst="rect">
+            <a:avLst/>
+          </a:prstGeom>
+          <a:noFill/>
+          <a:ln>
+            <a:noFill/>
+          </a:ln>
+        </p:spPr>
+        <p:style>
+          <a:lnRef idx="0"/>
+          <a:fillRef idx="0"/>
+          <a:effectRef idx="0"/>
+          <a:fontRef idx="minor"/>
+        </p:style>
+        <p:txBody>
+          <a:bodyPr lIns="90000" rIns="90000" tIns="45000" bIns="45000">
+            <a:spAutoFit/>
+          </a:bodyPr>
+          <a:p>
+            <a:pPr>
+              <a:lnSpc>
+                <a:spcPct val="100000"/>
+              </a:lnSpc>
+            </a:pPr>
+            <a:r>
+              <a:rPr b="0" lang="en-US" sz="1800" spc="-1" strike="noStrike">
+                <a:solidFill>
+                  <a:srgbClr val="000000"/>
+                </a:solidFill>
+                <a:latin typeface="Calibri"/>
+                <a:ea typeface="DejaVu Sans"/>
+              </a:rPr>
+              <a:t>fLRE</a:t>
+            </a:r>
+            <a:endParaRPr b="0" lang="en-US" sz="1800" spc="-1" strike="noStrike">
+              <a:latin typeface="Arial"/>
+            </a:endParaRPr>
+          </a:p>
+        </p:txBody>
+      </p:sp>
+      <p:sp>
+        <p:nvSpPr>
+          <p:cNvPr id="58" name="CustomShape 7"/>
+          <p:cNvSpPr/>
+          <p:nvPr/>
+        </p:nvSpPr>
+        <p:spPr>
+          <a:xfrm>
+            <a:off x="5868000" y="1244880"/>
+            <a:ext cx="882360" cy="455400"/>
+          </a:xfrm>
+          <a:prstGeom prst="rect">
+            <a:avLst/>
+          </a:prstGeom>
+          <a:noFill/>
+          <a:ln>
+            <a:noFill/>
+          </a:ln>
+        </p:spPr>
+        <p:style>
+          <a:lnRef idx="0"/>
+          <a:fillRef idx="0"/>
+          <a:effectRef idx="0"/>
+          <a:fontRef idx="minor"/>
+        </p:style>
+        <p:txBody>
+          <a:bodyPr lIns="90000" rIns="90000" tIns="45000" bIns="45000">
+            <a:spAutoFit/>
+          </a:bodyPr>
+          <a:p>
+            <a:pPr>
+              <a:lnSpc>
+                <a:spcPct val="100000"/>
+              </a:lnSpc>
+            </a:pPr>
+            <a:r>
+              <a:rPr b="1" lang="en-US" sz="2400" spc="-1" strike="noStrike">
+                <a:solidFill>
+                  <a:srgbClr val="000000"/>
+                </a:solidFill>
+                <a:latin typeface="Calibri"/>
+                <a:ea typeface="DejaVu Sans"/>
+              </a:rPr>
+              <a:t>b)</a:t>
+            </a:r>
+            <a:endParaRPr b="0" lang="en-US" sz="2400" spc="-1" strike="noStrike">
+              <a:latin typeface="Arial"/>
+            </a:endParaRPr>
+          </a:p>
+        </p:txBody>
+      </p:sp>
+      <p:sp>
+        <p:nvSpPr>
+          <p:cNvPr id="59" name="CustomShape 8"/>
+          <p:cNvSpPr/>
+          <p:nvPr/>
+        </p:nvSpPr>
+        <p:spPr>
+          <a:xfrm>
+            <a:off x="869040" y="1209600"/>
+            <a:ext cx="882360" cy="455400"/>
+          </a:xfrm>
+          <a:prstGeom prst="rect">
+            <a:avLst/>
+          </a:prstGeom>
+          <a:noFill/>
+          <a:ln>
+            <a:noFill/>
+          </a:ln>
+        </p:spPr>
+        <p:style>
+          <a:lnRef idx="0"/>
+          <a:fillRef idx="0"/>
+          <a:effectRef idx="0"/>
+          <a:fontRef idx="minor"/>
+        </p:style>
+        <p:txBody>
+          <a:bodyPr lIns="90000" rIns="90000" tIns="45000" bIns="45000">
+            <a:spAutoFit/>
+          </a:bodyPr>
+          <a:p>
+            <a:pPr>
+              <a:lnSpc>
+                <a:spcPct val="100000"/>
+              </a:lnSpc>
+            </a:pPr>
+            <a:r>
+              <a:rPr b="1" lang="en-US" sz="2400" spc="-1" strike="noStrike">
+                <a:solidFill>
+                  <a:srgbClr val="000000"/>
+                </a:solidFill>
+                <a:latin typeface="Calibri"/>
+                <a:ea typeface="DejaVu Sans"/>
+              </a:rPr>
+              <a:t>a)</a:t>
+            </a:r>
+            <a:endParaRPr b="0" lang="en-US" sz="2400" spc="-1" strike="noStrike">
+              <a:latin typeface="Arial"/>
+            </a:endParaRPr>
+          </a:p>
+        </p:txBody>
+      </p:sp>
+      <p:pic>
+        <p:nvPicPr>
+          <p:cNvPr id="60" name="" descr=""/>
+          <p:cNvPicPr/>
+          <p:nvPr/>
+        </p:nvPicPr>
+        <p:blipFill>
+          <a:blip r:embed="rId2"/>
+          <a:srcRect l="20778" t="17402" r="19045" b="0"/>
+          <a:stretch/>
+        </p:blipFill>
+        <p:spPr>
+          <a:xfrm>
+            <a:off x="914400" y="2011680"/>
+            <a:ext cx="5009400" cy="4297680"/>
+          </a:xfrm>
+          <a:prstGeom prst="rect">
+            <a:avLst/>
+          </a:prstGeom>
+          <a:ln>
+            <a:noFill/>
+          </a:ln>
+        </p:spPr>
+      </p:pic>
+      <p:sp>
+        <p:nvSpPr>
+          <p:cNvPr id="61" name="CustomShape 9"/>
+          <p:cNvSpPr/>
+          <p:nvPr/>
+        </p:nvSpPr>
+        <p:spPr>
+          <a:xfrm>
+            <a:off x="2409480" y="1592280"/>
+            <a:ext cx="882360" cy="363960"/>
+          </a:xfrm>
+          <a:prstGeom prst="rect">
+            <a:avLst/>
+          </a:prstGeom>
+          <a:noFill/>
+          <a:ln>
+            <a:noFill/>
+          </a:ln>
+        </p:spPr>
+        <p:style>
+          <a:lnRef idx="0"/>
+          <a:fillRef idx="0"/>
+          <a:effectRef idx="0"/>
+          <a:fontRef idx="minor"/>
+        </p:style>
+        <p:txBody>
+          <a:bodyPr lIns="90000" rIns="90000" tIns="45000" bIns="45000">
+            <a:spAutoFit/>
+          </a:bodyPr>
+          <a:p>
+            <a:pPr>
+              <a:lnSpc>
+                <a:spcPct val="100000"/>
+              </a:lnSpc>
+            </a:pPr>
+            <a:r>
+              <a:rPr b="0" lang="en-US" sz="1800" spc="-1" strike="noStrike">
+                <a:solidFill>
+                  <a:srgbClr val="000000"/>
+                </a:solidFill>
+                <a:latin typeface="Calibri"/>
+                <a:ea typeface="DejaVu Sans"/>
+              </a:rPr>
+              <a:t>dfLRI</a:t>
+            </a:r>
+            <a:endParaRPr b="0" lang="en-US" sz="1800" spc="-1" strike="noStrike">
+              <a:latin typeface="Arial"/>
+            </a:endParaRPr>
+          </a:p>
+        </p:txBody>
+      </p:sp>
+      <p:sp>
+        <p:nvSpPr>
+          <p:cNvPr id="62" name="CustomShape 10"/>
+          <p:cNvSpPr/>
+          <p:nvPr/>
+        </p:nvSpPr>
+        <p:spPr>
+          <a:xfrm>
+            <a:off x="238320" y="3408480"/>
+            <a:ext cx="882360" cy="363960"/>
+          </a:xfrm>
+          <a:prstGeom prst="rect">
+            <a:avLst/>
+          </a:prstGeom>
+          <a:noFill/>
+          <a:ln>
+            <a:noFill/>
+          </a:ln>
+        </p:spPr>
+        <p:style>
+          <a:lnRef idx="0"/>
+          <a:fillRef idx="0"/>
+          <a:effectRef idx="0"/>
+          <a:fontRef idx="minor"/>
+        </p:style>
+        <p:txBody>
+          <a:bodyPr lIns="90000" rIns="90000" tIns="45000" bIns="45000">
+            <a:spAutoFit/>
+          </a:bodyPr>
+          <a:p>
+            <a:pPr>
+              <a:lnSpc>
+                <a:spcPct val="100000"/>
+              </a:lnSpc>
+            </a:pPr>
+            <a:r>
+              <a:rPr b="0" lang="en-US" sz="1800" spc="-1" strike="noStrike">
+                <a:solidFill>
+                  <a:srgbClr val="000000"/>
+                </a:solidFill>
+                <a:latin typeface="Calibri"/>
+                <a:ea typeface="DejaVu Sans"/>
+              </a:rPr>
+              <a:t>dfLRI</a:t>
+            </a:r>
+            <a:endParaRPr b="0" lang="en-US" sz="1800" spc="-1" strike="noStrike">
+              <a:latin typeface="Arial"/>
+            </a:endParaRPr>
+          </a:p>
+        </p:txBody>
+      </p:sp>
+      <p:sp>
+        <p:nvSpPr>
+          <p:cNvPr id="63" name="CustomShape 11"/>
+          <p:cNvSpPr/>
+          <p:nvPr/>
+        </p:nvSpPr>
+        <p:spPr>
+          <a:xfrm>
+            <a:off x="6292800" y="1590840"/>
+            <a:ext cx="882360" cy="363960"/>
+          </a:xfrm>
+          <a:prstGeom prst="rect">
+            <a:avLst/>
+          </a:prstGeom>
+          <a:noFill/>
+          <a:ln>
+            <a:noFill/>
+          </a:ln>
+        </p:spPr>
+        <p:style>
+          <a:lnRef idx="0"/>
+          <a:fillRef idx="0"/>
+          <a:effectRef idx="0"/>
+          <a:fontRef idx="minor"/>
+        </p:style>
+        <p:txBody>
+          <a:bodyPr lIns="90000" rIns="90000" tIns="45000" bIns="45000">
+            <a:spAutoFit/>
+          </a:bodyPr>
+          <a:p>
+            <a:pPr>
+              <a:lnSpc>
+                <a:spcPct val="100000"/>
+              </a:lnSpc>
+            </a:pPr>
+            <a:r>
+              <a:rPr b="0" lang="en-US" sz="1800" spc="-1" strike="noStrike">
+                <a:solidFill>
+                  <a:srgbClr val="000000"/>
+                </a:solidFill>
+                <a:latin typeface="Calibri"/>
+                <a:ea typeface="DejaVu Sans"/>
+              </a:rPr>
+              <a:t>dLRI</a:t>
+            </a:r>
+            <a:endParaRPr b="0" lang="en-US" sz="1800" spc="-1" strike="noStrike">
+              <a:latin typeface="Arial"/>
+            </a:endParaRPr>
+          </a:p>
+        </p:txBody>
+      </p:sp>
+      <p:sp>
+        <p:nvSpPr>
+          <p:cNvPr id="64" name="CustomShape 12"/>
+          <p:cNvSpPr/>
+          <p:nvPr/>
+        </p:nvSpPr>
+        <p:spPr>
+          <a:xfrm>
+            <a:off x="8492760" y="1590840"/>
+            <a:ext cx="882360" cy="363960"/>
+          </a:xfrm>
+          <a:prstGeom prst="rect">
+            <a:avLst/>
+          </a:prstGeom>
+          <a:noFill/>
+          <a:ln>
+            <a:noFill/>
+          </a:ln>
+        </p:spPr>
+        <p:style>
+          <a:lnRef idx="0"/>
+          <a:fillRef idx="0"/>
+          <a:effectRef idx="0"/>
+          <a:fontRef idx="minor"/>
+        </p:style>
+        <p:txBody>
+          <a:bodyPr lIns="90000" rIns="90000" tIns="45000" bIns="45000">
+            <a:spAutoFit/>
+          </a:bodyPr>
+          <a:p>
+            <a:pPr>
+              <a:lnSpc>
+                <a:spcPct val="100000"/>
+              </a:lnSpc>
+            </a:pPr>
+            <a:r>
+              <a:rPr b="0" lang="en-US" sz="1800" spc="-1" strike="noStrike">
+                <a:solidFill>
+                  <a:srgbClr val="000000"/>
+                </a:solidFill>
+                <a:latin typeface="Calibri"/>
+                <a:ea typeface="DejaVu Sans"/>
+              </a:rPr>
+              <a:t>fLRI</a:t>
+            </a:r>
+            <a:endParaRPr b="0" lang="en-US" sz="1800" spc="-1" strike="noStrike">
+              <a:latin typeface="Arial"/>
+            </a:endParaRPr>
+          </a:p>
+        </p:txBody>
+      </p:sp>
+      <p:sp>
+        <p:nvSpPr>
+          <p:cNvPr id="65" name="CustomShape 13"/>
+          <p:cNvSpPr/>
+          <p:nvPr/>
+        </p:nvSpPr>
+        <p:spPr>
+          <a:xfrm>
+            <a:off x="9541800" y="1590840"/>
+            <a:ext cx="882360" cy="363960"/>
+          </a:xfrm>
+          <a:prstGeom prst="rect">
+            <a:avLst/>
+          </a:prstGeom>
+          <a:noFill/>
+          <a:ln>
+            <a:noFill/>
+          </a:ln>
+        </p:spPr>
+        <p:style>
+          <a:lnRef idx="0"/>
+          <a:fillRef idx="0"/>
+          <a:effectRef idx="0"/>
+          <a:fontRef idx="minor"/>
+        </p:style>
+        <p:txBody>
+          <a:bodyPr lIns="90000" rIns="90000" tIns="45000" bIns="45000">
+            <a:spAutoFit/>
+          </a:bodyPr>
+          <a:p>
+            <a:pPr>
+              <a:lnSpc>
+                <a:spcPct val="100000"/>
+              </a:lnSpc>
+            </a:pPr>
+            <a:r>
+              <a:rPr b="0" lang="en-US" sz="1800" spc="-1" strike="noStrike">
+                <a:solidFill>
+                  <a:srgbClr val="000000"/>
+                </a:solidFill>
+                <a:latin typeface="Calibri"/>
+                <a:ea typeface="DejaVu Sans"/>
+              </a:rPr>
+              <a:t>fLRE</a:t>
+            </a:r>
+            <a:endParaRPr b="0" lang="en-US" sz="1800" spc="-1" strike="noStrike">
+              <a:latin typeface="Arial"/>
+            </a:endParaRPr>
+          </a:p>
+        </p:txBody>
+      </p:sp>
+      <p:sp>
+        <p:nvSpPr>
+          <p:cNvPr id="66" name="CustomShape 14"/>
+          <p:cNvSpPr/>
+          <p:nvPr/>
+        </p:nvSpPr>
+        <p:spPr>
+          <a:xfrm>
+            <a:off x="7379640" y="1592280"/>
+            <a:ext cx="882360" cy="363960"/>
+          </a:xfrm>
+          <a:prstGeom prst="rect">
+            <a:avLst/>
+          </a:prstGeom>
+          <a:noFill/>
+          <a:ln>
+            <a:noFill/>
+          </a:ln>
+        </p:spPr>
+        <p:style>
+          <a:lnRef idx="0"/>
+          <a:fillRef idx="0"/>
+          <a:effectRef idx="0"/>
+          <a:fontRef idx="minor"/>
+        </p:style>
+        <p:txBody>
+          <a:bodyPr lIns="90000" rIns="90000" tIns="45000" bIns="45000">
+            <a:spAutoFit/>
+          </a:bodyPr>
+          <a:p>
+            <a:pPr>
+              <a:lnSpc>
+                <a:spcPct val="100000"/>
+              </a:lnSpc>
+            </a:pPr>
+            <a:r>
+              <a:rPr b="0" lang="en-US" sz="1800" spc="-1" strike="noStrike">
+                <a:solidFill>
+                  <a:srgbClr val="000000"/>
+                </a:solidFill>
+                <a:latin typeface="Calibri"/>
+                <a:ea typeface="DejaVu Sans"/>
+              </a:rPr>
+              <a:t>dfLRI</a:t>
+            </a:r>
+            <a:endParaRPr b="0" lang="en-US" sz="1800" spc="-1" strike="noStrike">
+              <a:latin typeface="Arial"/>
+            </a:endParaRPr>
+          </a:p>
+        </p:txBody>
+      </p:sp>
     </p:spTree>
   </p:cSld>
   <mc:AlternateContent>

</xml_diff>